<commit_message>
A lot of spelling later
</commit_message>
<xml_diff>
--- a/Milestones/M6 poster event/poster.pptx
+++ b/Milestones/M6 poster event/poster.pptx
@@ -1193,7 +1193,7 @@
           </a:ln>
           <a:extLst>
             <a:ext uri="{C572A759-6A51-4108-AA02-DFA0A04FC94B}">
-              <ma14:wrappingTextBoxFlag xmlns="" xmlns:m="http://schemas.openxmlformats.org/officeDocument/2006/math" xmlns:a14="http://schemas.microsoft.com/office/drawing/2010/main" xmlns:ma14="http://schemas.microsoft.com/office/mac/drawingml/2011/main" val="1"/>
+              <ma14:wrappingTextBoxFlag xmlns:ma14="http://schemas.microsoft.com/office/mac/drawingml/2011/main" xmlns:a14="http://schemas.microsoft.com/office/drawing/2010/main" xmlns:m="http://schemas.openxmlformats.org/officeDocument/2006/math" xmlns="" val="1"/>
             </a:ext>
           </a:extLst>
         </p:spPr>
@@ -1264,7 +1264,7 @@
           </a:ln>
           <a:extLst>
             <a:ext uri="{C572A759-6A51-4108-AA02-DFA0A04FC94B}">
-              <ma14:wrappingTextBoxFlag xmlns="" xmlns:m="http://schemas.openxmlformats.org/officeDocument/2006/math" xmlns:a14="http://schemas.microsoft.com/office/drawing/2010/main" xmlns:ma14="http://schemas.microsoft.com/office/mac/drawingml/2011/main" val="1"/>
+              <ma14:wrappingTextBoxFlag xmlns:ma14="http://schemas.microsoft.com/office/mac/drawingml/2011/main" xmlns:a14="http://schemas.microsoft.com/office/drawing/2010/main" xmlns:m="http://schemas.openxmlformats.org/officeDocument/2006/math" xmlns="" val="1"/>
             </a:ext>
           </a:extLst>
         </p:spPr>
@@ -1366,7 +1366,7 @@
           </a:ln>
           <a:extLst>
             <a:ext uri="{C572A759-6A51-4108-AA02-DFA0A04FC94B}">
-              <ma14:wrappingTextBoxFlag xmlns="" xmlns:m="http://schemas.openxmlformats.org/officeDocument/2006/math" xmlns:a14="http://schemas.microsoft.com/office/drawing/2010/main" xmlns:ma14="http://schemas.microsoft.com/office/mac/drawingml/2011/main" val="1"/>
+              <ma14:wrappingTextBoxFlag xmlns:ma14="http://schemas.microsoft.com/office/mac/drawingml/2011/main" xmlns:a14="http://schemas.microsoft.com/office/drawing/2010/main" xmlns:m="http://schemas.openxmlformats.org/officeDocument/2006/math" xmlns="" val="1"/>
             </a:ext>
           </a:extLst>
         </p:spPr>
@@ -1429,7 +1429,7 @@
           </a:ln>
           <a:extLst>
             <a:ext uri="{C572A759-6A51-4108-AA02-DFA0A04FC94B}">
-              <ma14:wrappingTextBoxFlag xmlns="" xmlns:m="http://schemas.openxmlformats.org/officeDocument/2006/math" xmlns:a14="http://schemas.microsoft.com/office/drawing/2010/main" xmlns:ma14="http://schemas.microsoft.com/office/mac/drawingml/2011/main" val="1"/>
+              <ma14:wrappingTextBoxFlag xmlns:ma14="http://schemas.microsoft.com/office/mac/drawingml/2011/main" xmlns:a14="http://schemas.microsoft.com/office/drawing/2010/main" xmlns:m="http://schemas.openxmlformats.org/officeDocument/2006/math" xmlns="" val="1"/>
             </a:ext>
           </a:extLst>
         </p:spPr>
@@ -2255,9 +2255,10 @@
           <a:p>
             <a:pPr algn="ctr"/>
             <a:r>
-              <a:rPr lang="en-US" sz="6000"/>
-              <a:t>Fuzzing constraint programming languages</a:t>
-            </a:r>
+              <a:rPr lang="en-GB" sz="6000"/>
+              <a:t>Fuzz Testing of Constraint Programming</a:t>
+            </a:r>
+            <a:endParaRPr lang="en-US" sz="6000" dirty="0"/>
           </a:p>
         </p:txBody>
       </p:sp>

</xml_diff>

<commit_message>
spelling fix on the poster
</commit_message>
<xml_diff>
--- a/Milestones/M6 poster event/poster.pptx
+++ b/Milestones/M6 poster event/poster.pptx
@@ -1193,7 +1193,7 @@
           </a:ln>
           <a:extLst>
             <a:ext uri="{C572A759-6A51-4108-AA02-DFA0A04FC94B}">
-              <ma14:wrappingTextBoxFlag xmlns:ma14="http://schemas.microsoft.com/office/mac/drawingml/2011/main" xmlns:a14="http://schemas.microsoft.com/office/drawing/2010/main" xmlns:m="http://schemas.openxmlformats.org/officeDocument/2006/math" xmlns="" val="1"/>
+              <ma14:wrappingTextBoxFlag xmlns="" xmlns:m="http://schemas.openxmlformats.org/officeDocument/2006/math" xmlns:a14="http://schemas.microsoft.com/office/drawing/2010/main" xmlns:ma14="http://schemas.microsoft.com/office/mac/drawingml/2011/main" val="1"/>
             </a:ext>
           </a:extLst>
         </p:spPr>
@@ -1264,7 +1264,7 @@
           </a:ln>
           <a:extLst>
             <a:ext uri="{C572A759-6A51-4108-AA02-DFA0A04FC94B}">
-              <ma14:wrappingTextBoxFlag xmlns:ma14="http://schemas.microsoft.com/office/mac/drawingml/2011/main" xmlns:a14="http://schemas.microsoft.com/office/drawing/2010/main" xmlns:m="http://schemas.openxmlformats.org/officeDocument/2006/math" xmlns="" val="1"/>
+              <ma14:wrappingTextBoxFlag xmlns="" xmlns:m="http://schemas.openxmlformats.org/officeDocument/2006/math" xmlns:a14="http://schemas.microsoft.com/office/drawing/2010/main" xmlns:ma14="http://schemas.microsoft.com/office/mac/drawingml/2011/main" val="1"/>
             </a:ext>
           </a:extLst>
         </p:spPr>
@@ -1366,7 +1366,7 @@
           </a:ln>
           <a:extLst>
             <a:ext uri="{C572A759-6A51-4108-AA02-DFA0A04FC94B}">
-              <ma14:wrappingTextBoxFlag xmlns:ma14="http://schemas.microsoft.com/office/mac/drawingml/2011/main" xmlns:a14="http://schemas.microsoft.com/office/drawing/2010/main" xmlns:m="http://schemas.openxmlformats.org/officeDocument/2006/math" xmlns="" val="1"/>
+              <ma14:wrappingTextBoxFlag xmlns="" xmlns:m="http://schemas.openxmlformats.org/officeDocument/2006/math" xmlns:a14="http://schemas.microsoft.com/office/drawing/2010/main" xmlns:ma14="http://schemas.microsoft.com/office/mac/drawingml/2011/main" val="1"/>
             </a:ext>
           </a:extLst>
         </p:spPr>
@@ -1429,7 +1429,7 @@
           </a:ln>
           <a:extLst>
             <a:ext uri="{C572A759-6A51-4108-AA02-DFA0A04FC94B}">
-              <ma14:wrappingTextBoxFlag xmlns:ma14="http://schemas.microsoft.com/office/mac/drawingml/2011/main" xmlns:a14="http://schemas.microsoft.com/office/drawing/2010/main" xmlns:m="http://schemas.openxmlformats.org/officeDocument/2006/math" xmlns="" val="1"/>
+              <ma14:wrappingTextBoxFlag xmlns="" xmlns:m="http://schemas.openxmlformats.org/officeDocument/2006/math" xmlns:a14="http://schemas.microsoft.com/office/drawing/2010/main" xmlns:ma14="http://schemas.microsoft.com/office/mac/drawingml/2011/main" val="1"/>
             </a:ext>
           </a:extLst>
         </p:spPr>
@@ -2302,18 +2302,11 @@
                 <a:latin typeface="Arial" panose="020B0604020202020204" pitchFamily="34" charset="0"/>
                 <a:cs typeface="Arial" panose="020B0604020202020204" pitchFamily="34" charset="0"/>
               </a:rPr>
-              <a:t>	The second technique takes the constraints of the problem and turns them into an 	equivalent but complex constraints. For example, a ‘variable1 == 4’ will be 	changed into ‘(</a:t>
+              <a:t>	The second technique takes the constraints of the problem and turns them into 	equivalent but complex constraints. For example, a ‘variable1 == 4’ will be 	changed into ‘(variable1 &gt;= 4) and (variable1 =&lt; 4)’</a:t>
             </a:r>
-            <a:r>
-              <a:rPr lang="en-US" sz="1800" dirty="0">
-                <a:solidFill>
-                  <a:srgbClr val="000000"/>
-                </a:solidFill>
-                <a:latin typeface="Arial" panose="020B0604020202020204" pitchFamily="34" charset="0"/>
-                <a:cs typeface="Arial" panose="020B0604020202020204" pitchFamily="34" charset="0"/>
-              </a:rPr>
-              <a:t>variable1 &gt;= 4) and </a:t>
-            </a:r>
+          </a:p>
+          <a:p>
+            <a:pPr defTabSz="411480"/>
             <a:r>
               <a:rPr lang="en-US" sz="2000" dirty="0">
                 <a:solidFill>
@@ -2322,30 +2315,7 @@
                 <a:latin typeface="Arial" panose="020B0604020202020204" pitchFamily="34" charset="0"/>
                 <a:cs typeface="Arial" panose="020B0604020202020204" pitchFamily="34" charset="0"/>
               </a:rPr>
-              <a:t>(</a:t>
-            </a:r>
-            <a:r>
-              <a:rPr lang="en-US" sz="1800" dirty="0">
-                <a:solidFill>
-                  <a:srgbClr val="000000"/>
-                </a:solidFill>
-                <a:latin typeface="Arial" panose="020B0604020202020204" pitchFamily="34" charset="0"/>
-                <a:cs typeface="Arial" panose="020B0604020202020204" pitchFamily="34" charset="0"/>
-              </a:rPr>
-              <a:t>variable1 =&lt; 4)’</a:t>
-            </a:r>
-          </a:p>
-          <a:p>
-            <a:pPr defTabSz="411480"/>
-            <a:r>
-              <a:rPr lang="en-US" sz="1800" dirty="0">
-                <a:solidFill>
-                  <a:srgbClr val="000000"/>
-                </a:solidFill>
-                <a:latin typeface="Arial" panose="020B0604020202020204" pitchFamily="34" charset="0"/>
-                <a:cs typeface="Arial" panose="020B0604020202020204" pitchFamily="34" charset="0"/>
-              </a:rPr>
-              <a:t>	In total 30 metamorphic transformations were implemented and can be reformed on an 	already transformed constraints to built even more complex ones.</a:t>
+              <a:t>	In total 30 metamorphic transformations were implemented and can be reformed 	on already transformed constraints to built even more complex ones.</a:t>
             </a:r>
           </a:p>
           <a:p>
@@ -2528,7 +2498,7 @@
                 <a:latin typeface="Arial" panose="020B0604020202020204" pitchFamily="34" charset="0"/>
                 <a:cs typeface="Arial" panose="020B0604020202020204" pitchFamily="34" charset="0"/>
               </a:rPr>
-              <a:t>	The last technique moves away from the fuzz testing world since no changes were 	made to the seed inputs. Instead of changes here the advantage of having multiple 	solvers was used.</a:t>
+              <a:t>	The last technique moves away from the fuzz testing world since no changes were 	made to the seed inputs. Instead of changing constraints, here the advantage of 	having 	multiple solvers was used.</a:t>
             </a:r>
           </a:p>
           <a:p>
@@ -2877,7 +2847,7 @@
                 <a:latin typeface="Arial" panose="020B0604020202020204" pitchFamily="34" charset="0"/>
                 <a:cs typeface="Arial" panose="020B0604020202020204" pitchFamily="34" charset="0"/>
               </a:rPr>
-              <a:t>	None of the techniques got a perfect score meaning that when looking for all bugs 	a combination of tools will be needed as in the real world there is no silver bullet on 	bug catching. This does not take away the utility of each of the techniques. 	Metamorphic testing can be used to guide the fuzz tester on a specific code area 	by choosing which metamorphic transformations used and differential testing is 	easy to set up and to test between similar solvers.</a:t>
+              <a:t>	None of the techniques got a perfect score, meaning that when looking for all bugs 	a combination of tools will be needed. As in the real world there is no silver bullet 	on bug catching. This does not take away the utility of each of the techniques 	used. Metamorphic testing can be used to guide the fuzz tester on a specific code 	area by choosing which metamorphic transformations used and differential testing 	is easy to set up and to test between similar solvers.</a:t>
             </a:r>
             <a:endParaRPr lang="en-US" sz="2800" dirty="0">
               <a:solidFill>
@@ -2937,14 +2907,14 @@
                 <a:effectLst/>
                 <a:latin typeface="Arial" panose="020B0604020202020204" pitchFamily="34" charset="0"/>
               </a:rPr>
-              <a:t>	T</a:t>
+              <a:t>	M</a:t>
             </a:r>
             <a:r>
               <a:rPr lang="en-GB" sz="2000" dirty="0">
                 <a:effectLst/>
                 <a:latin typeface="Arial" panose="020B0604020202020204" pitchFamily="34" charset="0"/>
               </a:rPr>
-              <a:t>he most interesting is fuzz testing the configuration space of the solvers on top of 	fuzz testing the input, as discussed by </a:t>
+              <a:t>ost interesting is fuzz testing the configuration space of the solvers on top of 	fuzz testing the input, as discussed by </a:t>
             </a:r>
             <a:r>
               <a:rPr lang="en-US" sz="2000" dirty="0">
@@ -2958,7 +2928,21 @@
                 <a:effectLst/>
                 <a:latin typeface="Arial" panose="020B0604020202020204" pitchFamily="34" charset="0"/>
               </a:rPr>
-              <a:t> [2]. or example, there 	could be bugs that only occur when certain optimizations are turned on or off like: 	dynamic symmetry breaking or others.</a:t>
+              <a:t> [2]. </a:t>
+            </a:r>
+            <a:r>
+              <a:rPr lang="en-GB" sz="2000">
+                <a:effectLst/>
+                <a:latin typeface="Arial" panose="020B0604020202020204" pitchFamily="34" charset="0"/>
+              </a:rPr>
+              <a:t>For </a:t>
+            </a:r>
+            <a:r>
+              <a:rPr lang="en-GB" sz="2000" dirty="0">
+                <a:effectLst/>
+                <a:latin typeface="Arial" panose="020B0604020202020204" pitchFamily="34" charset="0"/>
+              </a:rPr>
+              <a:t>example, there 	could be bugs that only occur when certain optimizations are turned on or off like: 	dynamic symmetry breaking or others.</a:t>
             </a:r>
             <a:endParaRPr lang="en-US" sz="2000" dirty="0">
               <a:solidFill>
@@ -3148,7 +3132,7 @@
             </a:br>
             <a:r>
               <a:rPr lang="en-US" sz="1600" dirty="0"/>
-              <a:t>Prof. Dr. T. Guns, Ir. I. Bleukx</a:t>
+              <a:t>Prof. dr. T. Guns, Ir. I. Bleukx</a:t>
             </a:r>
           </a:p>
         </p:txBody>
@@ -3258,8 +3242,8 @@
         </p:nvCxnSpPr>
         <p:spPr>
           <a:xfrm>
-            <a:off x="10691806" y="2089460"/>
-            <a:ext cx="80379" cy="24171106"/>
+            <a:off x="10691812" y="1717914"/>
+            <a:ext cx="80373" cy="24542652"/>
           </a:xfrm>
           <a:prstGeom prst="line">
             <a:avLst/>
@@ -3492,7 +3476,7 @@
                 <a:latin typeface="Arial" panose="020B0604020202020204" pitchFamily="34" charset="0"/>
                 <a:cs typeface="Arial" panose="020B0604020202020204" pitchFamily="34" charset="0"/>
               </a:rPr>
-              <a:t>	Regression tests?			(no focus on finding new bugs)</a:t>
+              <a:t>	Regression tests?			(No focus on finding new bugs)</a:t>
             </a:r>
             <a:endParaRPr kumimoji="0" lang="en-US" sz="1600" b="0" i="0" u="none" strike="noStrike" cap="none" spc="0" normalizeH="0" baseline="0" dirty="0">
               <a:ln>
@@ -3631,7 +3615,7 @@
                 <a:latin typeface="Arial" panose="020B0604020202020204" pitchFamily="34" charset="0"/>
                 <a:cs typeface="Arial" panose="020B0604020202020204" pitchFamily="34" charset="0"/>
               </a:rPr>
-              <a:t>	Bugs are practically unavoidable and always unwanted, especially when a user 	can not easily doublecheck the result, which is the case in constraint 	programming (CP). On top of that, CP often requires combinations of constraints 	to model a problem, these combinations of constraints may have never been 	seen by a CP-solver and therefore include untested code and bugs. </a:t>
+              <a:t>	Bugs are practically unavoidable and always unwanted, especially when a user 	can not easily doublecheck the result, which is the case in constraint 	programming (CP). On top of that, CP often requires combinations of constraints 	to model a problem, these combinations of constraints may have never been 	seen by a CP-solver and therefore could include untested code and bugs. </a:t>
             </a:r>
           </a:p>
           <a:p>
@@ -3729,7 +3713,7 @@
                 <a:latin typeface="Arial" panose="020B0604020202020204" pitchFamily="34" charset="0"/>
                 <a:cs typeface="Arial" panose="020B0604020202020204" pitchFamily="34" charset="0"/>
               </a:rPr>
-              <a:t>	Constraint programming (CP) is used to give solutions to </a:t>
+              <a:t>	CP is used to give solutions to </a:t>
             </a:r>
             <a:r>
               <a:rPr kumimoji="0" lang="en-US" sz="2000" b="0" i="0" u="none" strike="noStrike" cap="none" spc="0" normalizeH="0" baseline="0" dirty="0">
@@ -3755,7 +3739,7 @@
                 <a:latin typeface="Arial" panose="020B0604020202020204" pitchFamily="34" charset="0"/>
                 <a:cs typeface="Arial" panose="020B0604020202020204" pitchFamily="34" charset="0"/>
               </a:rPr>
-              <a:t> and 	logical problems in the form of constraints. In order to convey the problem to the 	solver, modeling languages have been like MiniZinc and CPMpy. </a:t>
+              <a:t> and logical problems in the form of 	constraints. In order to convey the problem to the solver, modeling languages 	have been created like MiniZinc and CPMpy. </a:t>
             </a:r>
           </a:p>
           <a:p>
@@ -3768,7 +3752,7 @@
                 <a:latin typeface="Arial" panose="020B0604020202020204" pitchFamily="34" charset="0"/>
                 <a:cs typeface="Arial" panose="020B0604020202020204" pitchFamily="34" charset="0"/>
               </a:rPr>
-              <a:t>	Fuzz testing is a way of creating new and complex inputs to test them on the 	software.</a:t>
+              <a:t>	Fuzz testing is a way of creating new and complex inputs, in order to test them 	on the 	software.</a:t>
             </a:r>
           </a:p>
           <a:p>
@@ -4888,8 +4872,8 @@
           <a:fontRef idx="none"/>
         </p:style>
       </p:cxnSp>
-      <mc:AlternateContent xmlns:mc="http://schemas.openxmlformats.org/markup-compatibility/2006">
-        <mc:Choice xmlns:a14="http://schemas.microsoft.com/office/drawing/2010/main" Requires="a14">
+      <mc:AlternateContent xmlns:mc="http://schemas.openxmlformats.org/markup-compatibility/2006" xmlns:a14="http://schemas.microsoft.com/office/drawing/2010/main">
+        <mc:Choice Requires="a14">
           <p:sp>
             <p:nvSpPr>
               <p:cNvPr id="66" name="TextBox 65">
@@ -5034,7 +5018,7 @@
             </p:txBody>
           </p:sp>
         </mc:Choice>
-        <mc:Fallback>
+        <mc:Fallback xmlns="">
           <p:sp>
             <p:nvSpPr>
               <p:cNvPr id="66" name="TextBox 65">
@@ -5973,6 +5957,14 @@
               <a:tabLst/>
             </a:pPr>
             <a:r>
+              <a:rPr lang="en-GB" sz="2400" dirty="0">
+                <a:solidFill>
+                  <a:srgbClr val="000000"/>
+                </a:solidFill>
+              </a:rPr>
+              <a:t>B</a:t>
+            </a:r>
+            <a:r>
               <a:rPr kumimoji="0" lang="en-GB" sz="2400" b="0" i="0" u="none" strike="noStrike" cap="none" spc="0" normalizeH="0" baseline="0" dirty="0">
                 <a:ln>
                   <a:noFill/>
@@ -5987,7 +5979,7 @@
                 <a:cs typeface="Gill Sans Nova"/>
                 <a:sym typeface="Gill Sans Nova"/>
               </a:rPr>
-              <a:t>bugs</a:t>
+              <a:t>ugs</a:t>
             </a:r>
             <a:endParaRPr kumimoji="0" lang="en-US" sz="1600" b="0" i="0" u="none" strike="noStrike" cap="none" spc="0" normalizeH="0" baseline="0" dirty="0">
               <a:ln>
@@ -7440,6 +7432,14 @@
               <a:tabLst/>
             </a:pPr>
             <a:r>
+              <a:rPr lang="en-GB" sz="2400" dirty="0">
+                <a:solidFill>
+                  <a:srgbClr val="000000"/>
+                </a:solidFill>
+              </a:rPr>
+              <a:t>B</a:t>
+            </a:r>
+            <a:r>
               <a:rPr kumimoji="0" lang="en-GB" sz="2400" b="0" i="0" u="none" strike="noStrike" cap="none" spc="0" normalizeH="0" baseline="0" dirty="0">
                 <a:ln>
                   <a:noFill/>
@@ -7454,7 +7454,7 @@
                 <a:cs typeface="Gill Sans Nova"/>
                 <a:sym typeface="Gill Sans Nova"/>
               </a:rPr>
-              <a:t>bugs</a:t>
+              <a:t>ugs</a:t>
             </a:r>
             <a:endParaRPr kumimoji="0" lang="en-US" sz="1600" b="0" i="0" u="none" strike="noStrike" cap="none" spc="0" normalizeH="0" baseline="0" dirty="0">
               <a:ln>
@@ -7541,7 +7541,7 @@
         <p:spPr>
           <a:xfrm>
             <a:off x="13359556" y="4679882"/>
-            <a:ext cx="6221283" cy="3563588"/>
+            <a:ext cx="6221283" cy="3474583"/>
           </a:xfrm>
           <a:prstGeom prst="rect">
             <a:avLst/>
@@ -8050,7 +8050,7 @@
         </p:nvSpPr>
         <p:spPr>
           <a:xfrm>
-            <a:off x="18131250" y="4983870"/>
+            <a:off x="18104879" y="4807386"/>
             <a:ext cx="1355888" cy="1200327"/>
           </a:xfrm>
           <a:prstGeom prst="rect">
@@ -8204,7 +8204,7 @@
         </p:nvSpPr>
         <p:spPr>
           <a:xfrm>
-            <a:off x="16008871" y="6583890"/>
+            <a:off x="16008871" y="6447560"/>
             <a:ext cx="3479163" cy="1569658"/>
           </a:xfrm>
           <a:prstGeom prst="rect">
@@ -8412,7 +8412,7 @@
         </p:nvCxnSpPr>
         <p:spPr>
           <a:xfrm rot="5400000">
-            <a:off x="18675833" y="6371516"/>
+            <a:off x="18611098" y="6175273"/>
             <a:ext cx="382797" cy="0"/>
           </a:xfrm>
           <a:prstGeom prst="straightConnector1">
@@ -9202,6 +9202,14 @@
               <a:tabLst/>
             </a:pPr>
             <a:r>
+              <a:rPr lang="en-GB" sz="2400" dirty="0">
+                <a:solidFill>
+                  <a:srgbClr val="000000"/>
+                </a:solidFill>
+              </a:rPr>
+              <a:t>s</a:t>
+            </a:r>
+            <a:r>
               <a:rPr kumimoji="0" lang="en-GB" sz="2400" b="0" i="0" u="none" strike="noStrike" cap="none" spc="0" normalizeH="0" baseline="0" dirty="0">
                 <a:ln>
                   <a:noFill/>
@@ -9216,7 +9224,7 @@
                 <a:cs typeface="Gill Sans Nova"/>
                 <a:sym typeface="Gill Sans Nova"/>
               </a:rPr>
-              <a:t>Solution 1 to solution 2 </a:t>
+              <a:t>olution 1 to solution 2 </a:t>
             </a:r>
             <a:r>
               <a:rPr lang="en-GB" sz="2400" dirty="0">
@@ -12010,7 +12018,7 @@
                     <a:lstStyle/>
                     <a:p>
                       <a:pPr algn="ctr" fontAlgn="b"/>
-                      <a:endParaRPr lang="en-US" sz="1400" b="0" i="0" u="none" strike="noStrike">
+                      <a:endParaRPr lang="en-US" sz="1400" b="0" i="0" u="none" strike="noStrike" dirty="0">
                         <a:solidFill>
                           <a:srgbClr val="000000"/>
                         </a:solidFill>

</xml_diff>